<commit_message>
ReactJS refactoring and modifications before presentation
</commit_message>
<xml_diff>
--- a/reactJS/Prezentacja.pptx
+++ b/reactJS/Prezentacja.pptx
@@ -9,8 +9,9 @@
     <p:sldId id="258" r:id="rId3"/>
     <p:sldId id="262" r:id="rId4"/>
     <p:sldId id="259" r:id="rId5"/>
-    <p:sldId id="260" r:id="rId6"/>
-    <p:sldId id="261" r:id="rId7"/>
+    <p:sldId id="263" r:id="rId6"/>
+    <p:sldId id="260" r:id="rId7"/>
+    <p:sldId id="261" r:id="rId8"/>
   </p:sldIdLst>
   <p:sldSz cx="12192000" cy="6858000"/>
   <p:notesSz cx="6858000" cy="9144000"/>
@@ -109,6 +110,11 @@
       </a:defRPr>
     </a:lvl9pPr>
   </p:defaultTextStyle>
+  <p:extLst>
+    <p:ext uri="{EFAFB233-063F-42B5-8137-9DF3F51BA10A}">
+      <p15:sldGuideLst xmlns:p15="http://schemas.microsoft.com/office/powerpoint/2012/main"/>
+    </p:ext>
+  </p:extLst>
 </p:presentation>
 </file>
 
@@ -243,7 +249,7 @@
           <a:p>
             <a:fld id="{0732348E-1665-48A5-9169-20DC01B7FA67}" type="datetimeFigureOut">
               <a:rPr lang="pl-PL" smtClean="0"/>
-              <a:t>15.12.2015</a:t>
+              <a:t>22.12.2015</a:t>
             </a:fld>
             <a:endParaRPr lang="pl-PL"/>
           </a:p>
@@ -413,7 +419,7 @@
           <a:p>
             <a:fld id="{0732348E-1665-48A5-9169-20DC01B7FA67}" type="datetimeFigureOut">
               <a:rPr lang="pl-PL" smtClean="0"/>
-              <a:t>15.12.2015</a:t>
+              <a:t>22.12.2015</a:t>
             </a:fld>
             <a:endParaRPr lang="pl-PL"/>
           </a:p>
@@ -593,7 +599,7 @@
           <a:p>
             <a:fld id="{0732348E-1665-48A5-9169-20DC01B7FA67}" type="datetimeFigureOut">
               <a:rPr lang="pl-PL" smtClean="0"/>
-              <a:t>15.12.2015</a:t>
+              <a:t>22.12.2015</a:t>
             </a:fld>
             <a:endParaRPr lang="pl-PL"/>
           </a:p>
@@ -763,7 +769,7 @@
           <a:p>
             <a:fld id="{0732348E-1665-48A5-9169-20DC01B7FA67}" type="datetimeFigureOut">
               <a:rPr lang="pl-PL" smtClean="0"/>
-              <a:t>15.12.2015</a:t>
+              <a:t>22.12.2015</a:t>
             </a:fld>
             <a:endParaRPr lang="pl-PL"/>
           </a:p>
@@ -1009,7 +1015,7 @@
           <a:p>
             <a:fld id="{0732348E-1665-48A5-9169-20DC01B7FA67}" type="datetimeFigureOut">
               <a:rPr lang="pl-PL" smtClean="0"/>
-              <a:t>15.12.2015</a:t>
+              <a:t>22.12.2015</a:t>
             </a:fld>
             <a:endParaRPr lang="pl-PL"/>
           </a:p>
@@ -1241,7 +1247,7 @@
           <a:p>
             <a:fld id="{0732348E-1665-48A5-9169-20DC01B7FA67}" type="datetimeFigureOut">
               <a:rPr lang="pl-PL" smtClean="0"/>
-              <a:t>15.12.2015</a:t>
+              <a:t>22.12.2015</a:t>
             </a:fld>
             <a:endParaRPr lang="pl-PL"/>
           </a:p>
@@ -1608,7 +1614,7 @@
           <a:p>
             <a:fld id="{0732348E-1665-48A5-9169-20DC01B7FA67}" type="datetimeFigureOut">
               <a:rPr lang="pl-PL" smtClean="0"/>
-              <a:t>15.12.2015</a:t>
+              <a:t>22.12.2015</a:t>
             </a:fld>
             <a:endParaRPr lang="pl-PL"/>
           </a:p>
@@ -1726,7 +1732,7 @@
           <a:p>
             <a:fld id="{0732348E-1665-48A5-9169-20DC01B7FA67}" type="datetimeFigureOut">
               <a:rPr lang="pl-PL" smtClean="0"/>
-              <a:t>15.12.2015</a:t>
+              <a:t>22.12.2015</a:t>
             </a:fld>
             <a:endParaRPr lang="pl-PL"/>
           </a:p>
@@ -1821,7 +1827,7 @@
           <a:p>
             <a:fld id="{0732348E-1665-48A5-9169-20DC01B7FA67}" type="datetimeFigureOut">
               <a:rPr lang="pl-PL" smtClean="0"/>
-              <a:t>15.12.2015</a:t>
+              <a:t>22.12.2015</a:t>
             </a:fld>
             <a:endParaRPr lang="pl-PL"/>
           </a:p>
@@ -2098,7 +2104,7 @@
           <a:p>
             <a:fld id="{0732348E-1665-48A5-9169-20DC01B7FA67}" type="datetimeFigureOut">
               <a:rPr lang="pl-PL" smtClean="0"/>
-              <a:t>15.12.2015</a:t>
+              <a:t>22.12.2015</a:t>
             </a:fld>
             <a:endParaRPr lang="pl-PL"/>
           </a:p>
@@ -2351,7 +2357,7 @@
           <a:p>
             <a:fld id="{0732348E-1665-48A5-9169-20DC01B7FA67}" type="datetimeFigureOut">
               <a:rPr lang="pl-PL" smtClean="0"/>
-              <a:t>15.12.2015</a:t>
+              <a:t>22.12.2015</a:t>
             </a:fld>
             <a:endParaRPr lang="pl-PL"/>
           </a:p>
@@ -2419,7 +2425,7 @@
       <p:bgPr>
         <a:blipFill dpi="0" rotWithShape="1">
           <a:blip r:embed="rId13">
-            <a:alphaModFix amt="13000"/>
+            <a:alphaModFix amt="4000"/>
             <a:lum/>
           </a:blip>
           <a:srcRect/>
@@ -2574,7 +2580,7 @@
           <a:p>
             <a:fld id="{0732348E-1665-48A5-9169-20DC01B7FA67}" type="datetimeFigureOut">
               <a:rPr lang="pl-PL" smtClean="0"/>
-              <a:t>15.12.2015</a:t>
+              <a:t>22.12.2015</a:t>
             </a:fld>
             <a:endParaRPr lang="pl-PL"/>
           </a:p>
@@ -3112,7 +3118,17 @@
                   </a:schemeClr>
                 </a:solidFill>
               </a:rPr>
-              <a:t>Elementy wykorzystywane podczas </a:t>
+              <a:t>Moduły </a:t>
+            </a:r>
+            <a:r>
+              <a:rPr lang="pl-PL" sz="3000" dirty="0" smtClean="0">
+                <a:solidFill>
+                  <a:schemeClr val="accent6">
+                    <a:lumMod val="50000"/>
+                  </a:schemeClr>
+                </a:solidFill>
+              </a:rPr>
+              <a:t>wykorzystywane podczas </a:t>
             </a:r>
             <a:r>
               <a:rPr lang="pl-PL" sz="3000" dirty="0" err="1" smtClean="0">
@@ -3174,6 +3190,13 @@
   <p:clrMapOvr>
     <a:masterClrMapping/>
   </p:clrMapOvr>
+  <p:timing>
+    <p:tnLst>
+      <p:par>
+        <p:cTn id="1" dur="indefinite" restart="never" nodeType="tmRoot"/>
+      </p:par>
+    </p:tnLst>
+  </p:timing>
 </p:sld>
 </file>
 
@@ -3350,7 +3373,17 @@
                   </a:schemeClr>
                 </a:solidFill>
               </a:rPr>
-              <a:t>  </a:t>
+              <a:t> </a:t>
+            </a:r>
+            <a:r>
+              <a:rPr lang="pl-PL" sz="3000" dirty="0" smtClean="0">
+                <a:solidFill>
+                  <a:schemeClr val="accent6">
+                    <a:lumMod val="50000"/>
+                  </a:schemeClr>
+                </a:solidFill>
+              </a:rPr>
+              <a:t>data </a:t>
             </a:r>
             <a:r>
               <a:rPr lang="pl-PL" sz="3000" dirty="0" err="1" smtClean="0">
@@ -3485,6 +3518,13 @@
   <p:clrMapOvr>
     <a:masterClrMapping/>
   </p:clrMapOvr>
+  <p:timing>
+    <p:tnLst>
+      <p:par>
+        <p:cTn id="1" dur="indefinite" restart="never" nodeType="tmRoot"/>
+      </p:par>
+    </p:tnLst>
+  </p:timing>
 </p:sld>
 </file>
 
@@ -3681,7 +3721,27 @@
                   </a:schemeClr>
                 </a:solidFill>
               </a:rPr>
-              <a:t> – pozwala uzyskać referencje do obiektu potomnego</a:t>
+              <a:t> – pozwala uzyskać referencje do </a:t>
+            </a:r>
+            <a:r>
+              <a:rPr lang="pl-PL" sz="3000" dirty="0" smtClean="0">
+                <a:solidFill>
+                  <a:schemeClr val="accent6">
+                    <a:lumMod val="50000"/>
+                  </a:schemeClr>
+                </a:solidFill>
+              </a:rPr>
+              <a:t>istniejących </a:t>
+            </a:r>
+            <a:r>
+              <a:rPr lang="pl-PL" sz="3000" dirty="0" smtClean="0">
+                <a:solidFill>
+                  <a:schemeClr val="accent6">
+                    <a:lumMod val="50000"/>
+                  </a:schemeClr>
+                </a:solidFill>
+              </a:rPr>
+              <a:t>obiektów</a:t>
             </a:r>
             <a:endParaRPr lang="pl-PL" sz="3000" dirty="0">
               <a:solidFill>
@@ -3703,6 +3763,13 @@
   <p:clrMapOvr>
     <a:masterClrMapping/>
   </p:clrMapOvr>
+  <p:timing>
+    <p:tnLst>
+      <p:par>
+        <p:cTn id="1" dur="indefinite" restart="never" nodeType="tmRoot"/>
+      </p:par>
+    </p:tnLst>
+  </p:timing>
 </p:sld>
 </file>
 
@@ -3748,7 +3815,7 @@
                   </a:schemeClr>
                 </a:solidFill>
               </a:rPr>
-              <a:t>Komponenty</a:t>
+              <a:t>Moduły </a:t>
             </a:r>
             <a:r>
               <a:rPr lang="pl-PL" sz="6000" b="1" dirty="0" smtClean="0">
@@ -3758,7 +3825,7 @@
                   </a:schemeClr>
                 </a:solidFill>
               </a:rPr>
-              <a:t> wykorzystywane podczas </a:t>
+              <a:t>wykorzystywane podczas </a:t>
             </a:r>
             <a:r>
               <a:rPr lang="pl-PL" sz="6000" b="1" dirty="0" err="1" smtClean="0">
@@ -3792,13 +3859,13 @@
         </p:nvSpPr>
         <p:spPr>
           <a:xfrm>
-            <a:off x="838200" y="2237105"/>
+            <a:off x="838200" y="2221865"/>
             <a:ext cx="10515600" cy="2243455"/>
           </a:xfrm>
         </p:spPr>
         <p:txBody>
           <a:bodyPr>
-            <a:normAutofit/>
+            <a:normAutofit fontScale="92500" lnSpcReduction="10000"/>
           </a:bodyPr>
           <a:lstStyle/>
           <a:p>
@@ -3830,8 +3897,57 @@
                   </a:schemeClr>
                 </a:solidFill>
               </a:rPr>
-              <a:t> o komponenty przypominające XML</a:t>
-            </a:r>
+              <a:t> o komponenty przypominające </a:t>
+            </a:r>
+            <a:r>
+              <a:rPr lang="pl-PL" sz="3000" dirty="0" smtClean="0">
+                <a:solidFill>
+                  <a:schemeClr val="accent6">
+                    <a:lumMod val="50000"/>
+                  </a:schemeClr>
+                </a:solidFill>
+              </a:rPr>
+              <a:t>XML</a:t>
+            </a:r>
+          </a:p>
+          <a:p>
+            <a:r>
+              <a:rPr lang="pl-PL" sz="3000" dirty="0" err="1">
+                <a:solidFill>
+                  <a:schemeClr val="accent6">
+                    <a:lumMod val="50000"/>
+                  </a:schemeClr>
+                </a:solidFill>
+              </a:rPr>
+              <a:t>Babelify</a:t>
+            </a:r>
+            <a:r>
+              <a:rPr lang="pl-PL" sz="3000" dirty="0">
+                <a:solidFill>
+                  <a:schemeClr val="accent6">
+                    <a:lumMod val="50000"/>
+                  </a:schemeClr>
+                </a:solidFill>
+              </a:rPr>
+              <a:t> - komponent transformujący element JSX na </a:t>
+            </a:r>
+            <a:r>
+              <a:rPr lang="pl-PL" sz="3000" dirty="0" smtClean="0">
+                <a:solidFill>
+                  <a:schemeClr val="accent6">
+                    <a:lumMod val="50000"/>
+                  </a:schemeClr>
+                </a:solidFill>
+              </a:rPr>
+              <a:t>JavaScript</a:t>
+            </a:r>
+            <a:endParaRPr lang="pl-PL" sz="3000" dirty="0" smtClean="0">
+              <a:solidFill>
+                <a:schemeClr val="accent6">
+                  <a:lumMod val="50000"/>
+                </a:schemeClr>
+              </a:solidFill>
+            </a:endParaRPr>
           </a:p>
           <a:p>
             <a:r>
@@ -3862,19 +3978,7 @@
                   </a:schemeClr>
                 </a:solidFill>
               </a:rPr>
-              <a:t> komponent umożliwiający zarządzanie zależnościami</a:t>
-            </a:r>
-          </a:p>
-          <a:p>
-            <a:r>
-              <a:rPr lang="pl-PL" sz="3000" dirty="0" err="1" smtClean="0">
-                <a:solidFill>
-                  <a:schemeClr val="accent6">
-                    <a:lumMod val="50000"/>
-                  </a:schemeClr>
-                </a:solidFill>
-              </a:rPr>
-              <a:t>Babelify</a:t>
+              <a:t> komponent umożliwiający zarządzanie </a:t>
             </a:r>
             <a:r>
               <a:rPr lang="pl-PL" sz="3000" dirty="0" smtClean="0">
@@ -3884,8 +3988,15 @@
                   </a:schemeClr>
                 </a:solidFill>
               </a:rPr>
-              <a:t> - komponent transformujący element JSX na JavaScript</a:t>
-            </a:r>
+              <a:t>zależnościami w stylu node.js</a:t>
+            </a:r>
+            <a:endParaRPr lang="pl-PL" sz="3000" dirty="0" smtClean="0">
+              <a:solidFill>
+                <a:schemeClr val="accent6">
+                  <a:lumMod val="50000"/>
+                </a:schemeClr>
+              </a:solidFill>
+            </a:endParaRPr>
           </a:p>
         </p:txBody>
       </p:sp>
@@ -3899,6 +4010,13 @@
   <p:clrMapOvr>
     <a:masterClrMapping/>
   </p:clrMapOvr>
+  <p:timing>
+    <p:tnLst>
+      <p:par>
+        <p:cTn id="1" dur="indefinite" restart="never" nodeType="tmRoot"/>
+      </p:par>
+    </p:tnLst>
+  </p:timing>
 </p:sld>
 </file>
 
@@ -3937,6 +4055,77 @@
           <a:lstStyle/>
           <a:p>
             <a:r>
+              <a:rPr lang="pl-PL" sz="6000" b="1" dirty="0">
+                <a:solidFill>
+                  <a:schemeClr val="accent6">
+                    <a:lumMod val="50000"/>
+                  </a:schemeClr>
+                </a:solidFill>
+              </a:rPr>
+              <a:t>Kilka </a:t>
+            </a:r>
+            <a:r>
+              <a:rPr lang="pl-PL" sz="6000" b="1" dirty="0" smtClean="0">
+                <a:solidFill>
+                  <a:schemeClr val="accent6">
+                    <a:lumMod val="50000"/>
+                  </a:schemeClr>
+                </a:solidFill>
+              </a:rPr>
+              <a:t>przykładów…</a:t>
+            </a:r>
+            <a:endParaRPr lang="pl-PL" sz="6000" b="1" dirty="0"/>
+          </a:p>
+        </p:txBody>
+      </p:sp>
+    </p:spTree>
+    <p:extLst>
+      <p:ext uri="{BB962C8B-B14F-4D97-AF65-F5344CB8AC3E}">
+        <p14:creationId xmlns:p14="http://schemas.microsoft.com/office/powerpoint/2010/main" val="986830640"/>
+      </p:ext>
+    </p:extLst>
+  </p:cSld>
+  <p:clrMapOvr>
+    <a:masterClrMapping/>
+  </p:clrMapOvr>
+</p:sld>
+</file>
+
+<file path=ppt/slides/slide6.xml><?xml version="1.0" encoding="utf-8"?>
+<p:sld xmlns:a="http://schemas.openxmlformats.org/drawingml/2006/main" xmlns:r="http://schemas.openxmlformats.org/officeDocument/2006/relationships" xmlns:p="http://schemas.openxmlformats.org/presentationml/2006/main">
+  <p:cSld>
+    <p:spTree>
+      <p:nvGrpSpPr>
+        <p:cNvPr id="1" name=""/>
+        <p:cNvGrpSpPr/>
+        <p:nvPr/>
+      </p:nvGrpSpPr>
+      <p:grpSpPr>
+        <a:xfrm>
+          <a:off x="0" y="0"/>
+          <a:ext cx="0" cy="0"/>
+          <a:chOff x="0" y="0"/>
+          <a:chExt cx="0" cy="0"/>
+        </a:xfrm>
+      </p:grpSpPr>
+      <p:sp>
+        <p:nvSpPr>
+          <p:cNvPr id="2" name="Tytuł 1"/>
+          <p:cNvSpPr>
+            <a:spLocks noGrp="1"/>
+          </p:cNvSpPr>
+          <p:nvPr>
+            <p:ph type="title"/>
+          </p:nvPr>
+        </p:nvSpPr>
+        <p:spPr/>
+        <p:txBody>
+          <a:bodyPr>
+            <a:normAutofit/>
+          </a:bodyPr>
+          <a:lstStyle/>
+          <a:p>
+            <a:r>
               <a:rPr lang="pl-PL" sz="6000" b="1" dirty="0" smtClean="0">
                 <a:solidFill>
                   <a:schemeClr val="accent6">
@@ -4039,10 +4228,17 @@
   <p:clrMapOvr>
     <a:masterClrMapping/>
   </p:clrMapOvr>
+  <p:timing>
+    <p:tnLst>
+      <p:par>
+        <p:cTn id="1" dur="indefinite" restart="never" nodeType="tmRoot"/>
+      </p:par>
+    </p:tnLst>
+  </p:timing>
 </p:sld>
 </file>
 
-<file path=ppt/slides/slide6.xml><?xml version="1.0" encoding="utf-8"?>
+<file path=ppt/slides/slide7.xml><?xml version="1.0" encoding="utf-8"?>
 <p:sld xmlns:a="http://schemas.openxmlformats.org/drawingml/2006/main" xmlns:r="http://schemas.openxmlformats.org/officeDocument/2006/relationships" xmlns:p="http://schemas.openxmlformats.org/presentationml/2006/main">
   <p:cSld>
     <p:spTree>

</xml_diff>

<commit_message>
reactJS - ostatnie modyfikacje
</commit_message>
<xml_diff>
--- a/reactJS/Prezentacja.pptx
+++ b/reactJS/Prezentacja.pptx
@@ -3118,7 +3118,7 @@
                   </a:schemeClr>
                 </a:solidFill>
               </a:rPr>
-              <a:t>Moduły </a:t>
+              <a:t>Narzędzia </a:t>
             </a:r>
             <a:r>
               <a:rPr lang="pl-PL" sz="3000" dirty="0" smtClean="0">
@@ -3373,17 +3373,7 @@
                   </a:schemeClr>
                 </a:solidFill>
               </a:rPr>
-              <a:t> </a:t>
-            </a:r>
-            <a:r>
-              <a:rPr lang="pl-PL" sz="3000" dirty="0" smtClean="0">
-                <a:solidFill>
-                  <a:schemeClr val="accent6">
-                    <a:lumMod val="50000"/>
-                  </a:schemeClr>
-                </a:solidFill>
-              </a:rPr>
-              <a:t>data </a:t>
+              <a:t> data </a:t>
             </a:r>
             <a:r>
               <a:rPr lang="pl-PL" sz="3000" dirty="0" err="1" smtClean="0">
@@ -3721,7 +3711,7 @@
                   </a:schemeClr>
                 </a:solidFill>
               </a:rPr>
-              <a:t> – pozwala uzyskać referencje do </a:t>
+              <a:t> – </a:t>
             </a:r>
             <a:r>
               <a:rPr lang="pl-PL" sz="3000" dirty="0" smtClean="0">
@@ -3731,7 +3721,27 @@
                   </a:schemeClr>
                 </a:solidFill>
               </a:rPr>
-              <a:t>istniejących </a:t>
+              <a:t>kontener obiektów, pozwala </a:t>
+            </a:r>
+            <a:r>
+              <a:rPr lang="pl-PL" sz="3000" dirty="0" smtClean="0">
+                <a:solidFill>
+                  <a:schemeClr val="accent6">
+                    <a:lumMod val="50000"/>
+                  </a:schemeClr>
+                </a:solidFill>
+              </a:rPr>
+              <a:t>uzyskać referencje do </a:t>
+            </a:r>
+            <a:r>
+              <a:rPr lang="pl-PL" sz="3000" dirty="0" smtClean="0">
+                <a:solidFill>
+                  <a:schemeClr val="accent6">
+                    <a:lumMod val="50000"/>
+                  </a:schemeClr>
+                </a:solidFill>
+              </a:rPr>
+              <a:t>utworzonych </a:t>
             </a:r>
             <a:r>
               <a:rPr lang="pl-PL" sz="3000" dirty="0" smtClean="0">
@@ -3815,7 +3825,17 @@
                   </a:schemeClr>
                 </a:solidFill>
               </a:rPr>
-              <a:t>Moduły </a:t>
+              <a:t>Narzędzia</a:t>
+            </a:r>
+            <a:r>
+              <a:rPr lang="pl-PL" sz="6000" b="1" dirty="0" smtClean="0">
+                <a:solidFill>
+                  <a:schemeClr val="accent6">
+                    <a:lumMod val="50000"/>
+                  </a:schemeClr>
+                </a:solidFill>
+              </a:rPr>
+              <a:t> </a:t>
             </a:r>
             <a:r>
               <a:rPr lang="pl-PL" sz="6000" b="1" dirty="0" smtClean="0">
@@ -3897,7 +3917,29 @@
                   </a:schemeClr>
                 </a:solidFill>
               </a:rPr>
-              <a:t> o komponenty przypominające </a:t>
+              <a:t> o komponenty przypominające XML</a:t>
+            </a:r>
+          </a:p>
+          <a:p>
+            <a:r>
+              <a:rPr lang="pl-PL" sz="3000" dirty="0" err="1">
+                <a:solidFill>
+                  <a:schemeClr val="accent6">
+                    <a:lumMod val="50000"/>
+                  </a:schemeClr>
+                </a:solidFill>
+              </a:rPr>
+              <a:t>Babelify</a:t>
+            </a:r>
+            <a:r>
+              <a:rPr lang="pl-PL" sz="3000" dirty="0">
+                <a:solidFill>
+                  <a:schemeClr val="accent6">
+                    <a:lumMod val="50000"/>
+                  </a:schemeClr>
+                </a:solidFill>
+              </a:rPr>
+              <a:t> - komponent transformujący element JSX na </a:t>
             </a:r>
             <a:r>
               <a:rPr lang="pl-PL" sz="3000" dirty="0" smtClean="0">
@@ -3907,19 +3949,19 @@
                   </a:schemeClr>
                 </a:solidFill>
               </a:rPr>
-              <a:t>XML</a:t>
-            </a:r>
-          </a:p>
-          <a:p>
-            <a:r>
-              <a:rPr lang="pl-PL" sz="3000" dirty="0" err="1">
-                <a:solidFill>
-                  <a:schemeClr val="accent6">
-                    <a:lumMod val="50000"/>
-                  </a:schemeClr>
-                </a:solidFill>
-              </a:rPr>
-              <a:t>Babelify</a:t>
+              <a:t>JavaScript</a:t>
+            </a:r>
+          </a:p>
+          <a:p>
+            <a:r>
+              <a:rPr lang="pl-PL" sz="3000" dirty="0" err="1" smtClean="0">
+                <a:solidFill>
+                  <a:schemeClr val="accent6">
+                    <a:lumMod val="50000"/>
+                  </a:schemeClr>
+                </a:solidFill>
+              </a:rPr>
+              <a:t>Browserify</a:t>
             </a:r>
             <a:r>
               <a:rPr lang="pl-PL" sz="3000" dirty="0">
@@ -3929,7 +3971,7 @@
                   </a:schemeClr>
                 </a:solidFill>
               </a:rPr>
-              <a:t> - komponent transformujący element JSX na </a:t>
+              <a:t> -</a:t>
             </a:r>
             <a:r>
               <a:rPr lang="pl-PL" sz="3000" dirty="0" smtClean="0">
@@ -3939,17 +3981,18 @@
                   </a:schemeClr>
                 </a:solidFill>
               </a:rPr>
-              <a:t>JavaScript</a:t>
-            </a:r>
-            <a:endParaRPr lang="pl-PL" sz="3000" dirty="0" smtClean="0">
-              <a:solidFill>
-                <a:schemeClr val="accent6">
-                  <a:lumMod val="50000"/>
-                </a:schemeClr>
-              </a:solidFill>
-            </a:endParaRPr>
-          </a:p>
-          <a:p>
+              <a:t> komponent umożliwiający zarządzanie zależnościami w stylu </a:t>
+            </a:r>
+            <a:r>
+              <a:rPr lang="pl-PL" sz="3000" dirty="0" smtClean="0">
+                <a:solidFill>
+                  <a:schemeClr val="accent6">
+                    <a:lumMod val="50000"/>
+                  </a:schemeClr>
+                </a:solidFill>
+              </a:rPr>
+              <a:t>node.js (</a:t>
+            </a:r>
             <a:r>
               <a:rPr lang="pl-PL" sz="3000" dirty="0" err="1" smtClean="0">
                 <a:solidFill>
@@ -3958,37 +4001,17 @@
                   </a:schemeClr>
                 </a:solidFill>
               </a:rPr>
-              <a:t>Browserify</a:t>
-            </a:r>
-            <a:r>
-              <a:rPr lang="pl-PL" sz="3000" dirty="0">
-                <a:solidFill>
-                  <a:schemeClr val="accent6">
-                    <a:lumMod val="50000"/>
-                  </a:schemeClr>
-                </a:solidFill>
-              </a:rPr>
-              <a:t> -</a:t>
-            </a:r>
-            <a:r>
-              <a:rPr lang="pl-PL" sz="3000" dirty="0" smtClean="0">
-                <a:solidFill>
-                  <a:schemeClr val="accent6">
-                    <a:lumMod val="50000"/>
-                  </a:schemeClr>
-                </a:solidFill>
-              </a:rPr>
-              <a:t> komponent umożliwiający zarządzanie </a:t>
-            </a:r>
-            <a:r>
-              <a:rPr lang="pl-PL" sz="3000" dirty="0" smtClean="0">
-                <a:solidFill>
-                  <a:schemeClr val="accent6">
-                    <a:lumMod val="50000"/>
-                  </a:schemeClr>
-                </a:solidFill>
-              </a:rPr>
-              <a:t>zależnościami w stylu node.js</a:t>
+              <a:t>require</a:t>
+            </a:r>
+            <a:r>
+              <a:rPr lang="pl-PL" sz="3000" smtClean="0">
+                <a:solidFill>
+                  <a:schemeClr val="accent6">
+                    <a:lumMod val="50000"/>
+                  </a:schemeClr>
+                </a:solidFill>
+              </a:rPr>
+              <a:t>())</a:t>
             </a:r>
             <a:endParaRPr lang="pl-PL" sz="3000" dirty="0" smtClean="0">
               <a:solidFill>

</xml_diff>